<commit_message>
showed that the main has no initial HTML files
</commit_message>
<xml_diff>
--- a/GitBranchesDiagram-NBCC.pptx
+++ b/GitBranchesDiagram-NBCC.pptx
@@ -3370,10 +3370,167 @@
       </p:cxnSp>
       <p:sp>
         <p:nvSpPr>
-          <p:cNvPr id="6" name="Oval 5">
-            <a:extLst>
-              <a:ext uri="{FF2B5EF4-FFF2-40B4-BE49-F238E27FC236}">
-                <a16:creationId xmlns:a16="http://schemas.microsoft.com/office/drawing/2014/main" id="{F23B26D0-6586-4A08-5EE1-D19DF5DD97B0}"/>
+          <p:cNvPr id="8" name="TextBox 7">
+            <a:extLst>
+              <a:ext uri="{FF2B5EF4-FFF2-40B4-BE49-F238E27FC236}">
+                <a16:creationId xmlns:a16="http://schemas.microsoft.com/office/drawing/2014/main" id="{DCC373A2-0089-CBF1-B295-8C9996714101}"/>
+              </a:ext>
+            </a:extLst>
+          </p:cNvPr>
+          <p:cNvSpPr txBox="1"/>
+          <p:nvPr/>
+        </p:nvSpPr>
+        <p:spPr>
+          <a:xfrm>
+            <a:off x="10943948" y="649881"/>
+            <a:ext cx="849656" cy="369332"/>
+          </a:xfrm>
+          <a:prstGeom prst="rect">
+            <a:avLst/>
+          </a:prstGeom>
+          <a:noFill/>
+        </p:spPr>
+        <p:txBody>
+          <a:bodyPr wrap="none" rtlCol="0">
+            <a:spAutoFit/>
+          </a:bodyPr>
+          <a:lstStyle/>
+          <a:p>
+            <a:r>
+              <a:rPr lang="en-US" i="1" dirty="0"/>
+              <a:t>Master</a:t>
+            </a:r>
+          </a:p>
+        </p:txBody>
+      </p:sp>
+      <p:cxnSp>
+        <p:nvCxnSpPr>
+          <p:cNvPr id="9" name="Straight Arrow Connector 8">
+            <a:extLst>
+              <a:ext uri="{FF2B5EF4-FFF2-40B4-BE49-F238E27FC236}">
+                <a16:creationId xmlns:a16="http://schemas.microsoft.com/office/drawing/2014/main" id="{43FB4708-8F9C-C633-63CB-7A208A6C2B5F}"/>
+              </a:ext>
+            </a:extLst>
+          </p:cNvPr>
+          <p:cNvCxnSpPr>
+            <a:cxnSpLocks/>
+            <a:stCxn id="50" idx="6"/>
+          </p:cNvCxnSpPr>
+          <p:nvPr/>
+        </p:nvCxnSpPr>
+        <p:spPr>
+          <a:xfrm flipV="1">
+            <a:off x="1481309" y="2187935"/>
+            <a:ext cx="10220154" cy="10275"/>
+          </a:xfrm>
+          <a:prstGeom prst="straightConnector1">
+            <a:avLst/>
+          </a:prstGeom>
+          <a:ln w="28575">
+            <a:solidFill>
+              <a:schemeClr val="accent2"/>
+            </a:solidFill>
+            <a:tailEnd type="triangle"/>
+          </a:ln>
+        </p:spPr>
+        <p:style>
+          <a:lnRef idx="1">
+            <a:schemeClr val="accent1"/>
+          </a:lnRef>
+          <a:fillRef idx="0">
+            <a:schemeClr val="accent1"/>
+          </a:fillRef>
+          <a:effectRef idx="0">
+            <a:schemeClr val="accent1"/>
+          </a:effectRef>
+          <a:fontRef idx="minor">
+            <a:schemeClr val="tx1"/>
+          </a:fontRef>
+        </p:style>
+      </p:cxnSp>
+      <p:sp>
+        <p:nvSpPr>
+          <p:cNvPr id="11" name="TextBox 10">
+            <a:extLst>
+              <a:ext uri="{FF2B5EF4-FFF2-40B4-BE49-F238E27FC236}">
+                <a16:creationId xmlns:a16="http://schemas.microsoft.com/office/drawing/2014/main" id="{E7D10DBC-6555-885E-0C4E-0EEC92DB81D8}"/>
+              </a:ext>
+            </a:extLst>
+          </p:cNvPr>
+          <p:cNvSpPr txBox="1"/>
+          <p:nvPr/>
+        </p:nvSpPr>
+        <p:spPr>
+          <a:xfrm>
+            <a:off x="10943948" y="1853740"/>
+            <a:ext cx="545790" cy="369332"/>
+          </a:xfrm>
+          <a:prstGeom prst="rect">
+            <a:avLst/>
+          </a:prstGeom>
+          <a:noFill/>
+        </p:spPr>
+        <p:txBody>
+          <a:bodyPr wrap="none" rtlCol="0">
+            <a:spAutoFit/>
+          </a:bodyPr>
+          <a:lstStyle/>
+          <a:p>
+            <a:r>
+              <a:rPr lang="en-US" i="1" dirty="0"/>
+              <a:t>Dev</a:t>
+            </a:r>
+          </a:p>
+        </p:txBody>
+      </p:sp>
+      <p:cxnSp>
+        <p:nvCxnSpPr>
+          <p:cNvPr id="12" name="Straight Arrow Connector 11">
+            <a:extLst>
+              <a:ext uri="{FF2B5EF4-FFF2-40B4-BE49-F238E27FC236}">
+                <a16:creationId xmlns:a16="http://schemas.microsoft.com/office/drawing/2014/main" id="{5A75948E-B98C-7120-54EF-8FFF33102793}"/>
+              </a:ext>
+            </a:extLst>
+          </p:cNvPr>
+          <p:cNvCxnSpPr>
+            <a:cxnSpLocks/>
+            <a:endCxn id="82" idx="2"/>
+          </p:cNvCxnSpPr>
+          <p:nvPr/>
+        </p:nvCxnSpPr>
+        <p:spPr>
+          <a:xfrm flipV="1">
+            <a:off x="1609592" y="2964002"/>
+            <a:ext cx="4072158" cy="22810"/>
+          </a:xfrm>
+          <a:prstGeom prst="straightConnector1">
+            <a:avLst/>
+          </a:prstGeom>
+          <a:ln>
+            <a:tailEnd type="triangle"/>
+          </a:ln>
+        </p:spPr>
+        <p:style>
+          <a:lnRef idx="1">
+            <a:schemeClr val="accent1"/>
+          </a:lnRef>
+          <a:fillRef idx="0">
+            <a:schemeClr val="accent1"/>
+          </a:fillRef>
+          <a:effectRef idx="0">
+            <a:schemeClr val="accent1"/>
+          </a:effectRef>
+          <a:fontRef idx="minor">
+            <a:schemeClr val="tx1"/>
+          </a:fontRef>
+        </p:style>
+      </p:cxnSp>
+      <p:sp>
+        <p:nvSpPr>
+          <p:cNvPr id="13" name="Oval 12">
+            <a:extLst>
+              <a:ext uri="{FF2B5EF4-FFF2-40B4-BE49-F238E27FC236}">
+                <a16:creationId xmlns:a16="http://schemas.microsoft.com/office/drawing/2014/main" id="{D6F47AC9-45F2-715E-097C-4A746AC196F4}"/>
               </a:ext>
             </a:extLst>
           </p:cNvPr>
@@ -3382,15 +3539,12 @@
         </p:nvSpPr>
         <p:spPr>
           <a:xfrm>
-            <a:off x="826718" y="814975"/>
+            <a:off x="1453017" y="2830237"/>
             <a:ext cx="313150" cy="313150"/>
           </a:xfrm>
           <a:prstGeom prst="ellipse">
             <a:avLst/>
           </a:prstGeom>
-          <a:solidFill>
-            <a:schemeClr val="tx1"/>
-          </a:solidFill>
         </p:spPr>
         <p:style>
           <a:lnRef idx="2">
@@ -3419,10 +3573,10 @@
       </p:sp>
       <p:sp>
         <p:nvSpPr>
-          <p:cNvPr id="8" name="TextBox 7">
-            <a:extLst>
-              <a:ext uri="{FF2B5EF4-FFF2-40B4-BE49-F238E27FC236}">
-                <a16:creationId xmlns:a16="http://schemas.microsoft.com/office/drawing/2014/main" id="{DCC373A2-0089-CBF1-B295-8C9996714101}"/>
+          <p:cNvPr id="14" name="TextBox 13">
+            <a:extLst>
+              <a:ext uri="{FF2B5EF4-FFF2-40B4-BE49-F238E27FC236}">
+                <a16:creationId xmlns:a16="http://schemas.microsoft.com/office/drawing/2014/main" id="{36B1C7CF-9979-DA17-B9BA-396119E0755E}"/>
               </a:ext>
             </a:extLst>
           </p:cNvPr>
@@ -3431,8 +3585,8 @@
         </p:nvSpPr>
         <p:spPr>
           <a:xfrm>
-            <a:off x="10943948" y="649881"/>
-            <a:ext cx="849656" cy="369332"/>
+            <a:off x="2540361" y="2709030"/>
+            <a:ext cx="1515030" cy="369332"/>
           </a:xfrm>
           <a:prstGeom prst="rect">
             <a:avLst/>
@@ -3446,209 +3600,6 @@
           <a:lstStyle/>
           <a:p>
             <a:r>
-              <a:rPr lang="en-US" i="1" dirty="0"/>
-              <a:t>Master</a:t>
-            </a:r>
-          </a:p>
-        </p:txBody>
-      </p:sp>
-      <p:cxnSp>
-        <p:nvCxnSpPr>
-          <p:cNvPr id="9" name="Straight Arrow Connector 8">
-            <a:extLst>
-              <a:ext uri="{FF2B5EF4-FFF2-40B4-BE49-F238E27FC236}">
-                <a16:creationId xmlns:a16="http://schemas.microsoft.com/office/drawing/2014/main" id="{43FB4708-8F9C-C633-63CB-7A208A6C2B5F}"/>
-              </a:ext>
-            </a:extLst>
-          </p:cNvPr>
-          <p:cNvCxnSpPr>
-            <a:cxnSpLocks/>
-            <a:stCxn id="50" idx="6"/>
-          </p:cNvCxnSpPr>
-          <p:nvPr/>
-        </p:nvCxnSpPr>
-        <p:spPr>
-          <a:xfrm flipV="1">
-            <a:off x="1481309" y="2187935"/>
-            <a:ext cx="10220154" cy="10275"/>
-          </a:xfrm>
-          <a:prstGeom prst="straightConnector1">
-            <a:avLst/>
-          </a:prstGeom>
-          <a:ln w="28575">
-            <a:solidFill>
-              <a:schemeClr val="accent2"/>
-            </a:solidFill>
-            <a:tailEnd type="triangle"/>
-          </a:ln>
-        </p:spPr>
-        <p:style>
-          <a:lnRef idx="1">
-            <a:schemeClr val="accent1"/>
-          </a:lnRef>
-          <a:fillRef idx="0">
-            <a:schemeClr val="accent1"/>
-          </a:fillRef>
-          <a:effectRef idx="0">
-            <a:schemeClr val="accent1"/>
-          </a:effectRef>
-          <a:fontRef idx="minor">
-            <a:schemeClr val="tx1"/>
-          </a:fontRef>
-        </p:style>
-      </p:cxnSp>
-      <p:sp>
-        <p:nvSpPr>
-          <p:cNvPr id="11" name="TextBox 10">
-            <a:extLst>
-              <a:ext uri="{FF2B5EF4-FFF2-40B4-BE49-F238E27FC236}">
-                <a16:creationId xmlns:a16="http://schemas.microsoft.com/office/drawing/2014/main" id="{E7D10DBC-6555-885E-0C4E-0EEC92DB81D8}"/>
-              </a:ext>
-            </a:extLst>
-          </p:cNvPr>
-          <p:cNvSpPr txBox="1"/>
-          <p:nvPr/>
-        </p:nvSpPr>
-        <p:spPr>
-          <a:xfrm>
-            <a:off x="10943948" y="1853740"/>
-            <a:ext cx="545790" cy="369332"/>
-          </a:xfrm>
-          <a:prstGeom prst="rect">
-            <a:avLst/>
-          </a:prstGeom>
-          <a:noFill/>
-        </p:spPr>
-        <p:txBody>
-          <a:bodyPr wrap="none" rtlCol="0">
-            <a:spAutoFit/>
-          </a:bodyPr>
-          <a:lstStyle/>
-          <a:p>
-            <a:r>
-              <a:rPr lang="en-US" i="1" dirty="0"/>
-              <a:t>Dev</a:t>
-            </a:r>
-          </a:p>
-        </p:txBody>
-      </p:sp>
-      <p:cxnSp>
-        <p:nvCxnSpPr>
-          <p:cNvPr id="12" name="Straight Arrow Connector 11">
-            <a:extLst>
-              <a:ext uri="{FF2B5EF4-FFF2-40B4-BE49-F238E27FC236}">
-                <a16:creationId xmlns:a16="http://schemas.microsoft.com/office/drawing/2014/main" id="{5A75948E-B98C-7120-54EF-8FFF33102793}"/>
-              </a:ext>
-            </a:extLst>
-          </p:cNvPr>
-          <p:cNvCxnSpPr>
-            <a:cxnSpLocks/>
-            <a:endCxn id="82" idx="2"/>
-          </p:cNvCxnSpPr>
-          <p:nvPr/>
-        </p:nvCxnSpPr>
-        <p:spPr>
-          <a:xfrm flipV="1">
-            <a:off x="1609592" y="2964002"/>
-            <a:ext cx="4072158" cy="22810"/>
-          </a:xfrm>
-          <a:prstGeom prst="straightConnector1">
-            <a:avLst/>
-          </a:prstGeom>
-          <a:ln>
-            <a:tailEnd type="triangle"/>
-          </a:ln>
-        </p:spPr>
-        <p:style>
-          <a:lnRef idx="1">
-            <a:schemeClr val="accent1"/>
-          </a:lnRef>
-          <a:fillRef idx="0">
-            <a:schemeClr val="accent1"/>
-          </a:fillRef>
-          <a:effectRef idx="0">
-            <a:schemeClr val="accent1"/>
-          </a:effectRef>
-          <a:fontRef idx="minor">
-            <a:schemeClr val="tx1"/>
-          </a:fontRef>
-        </p:style>
-      </p:cxnSp>
-      <p:sp>
-        <p:nvSpPr>
-          <p:cNvPr id="13" name="Oval 12">
-            <a:extLst>
-              <a:ext uri="{FF2B5EF4-FFF2-40B4-BE49-F238E27FC236}">
-                <a16:creationId xmlns:a16="http://schemas.microsoft.com/office/drawing/2014/main" id="{D6F47AC9-45F2-715E-097C-4A746AC196F4}"/>
-              </a:ext>
-            </a:extLst>
-          </p:cNvPr>
-          <p:cNvSpPr/>
-          <p:nvPr/>
-        </p:nvSpPr>
-        <p:spPr>
-          <a:xfrm>
-            <a:off x="1453017" y="2830237"/>
-            <a:ext cx="313150" cy="313150"/>
-          </a:xfrm>
-          <a:prstGeom prst="ellipse">
-            <a:avLst/>
-          </a:prstGeom>
-        </p:spPr>
-        <p:style>
-          <a:lnRef idx="2">
-            <a:schemeClr val="accent1">
-              <a:shade val="50000"/>
-            </a:schemeClr>
-          </a:lnRef>
-          <a:fillRef idx="1">
-            <a:schemeClr val="accent1"/>
-          </a:fillRef>
-          <a:effectRef idx="0">
-            <a:schemeClr val="accent1"/>
-          </a:effectRef>
-          <a:fontRef idx="minor">
-            <a:schemeClr val="lt1"/>
-          </a:fontRef>
-        </p:style>
-        <p:txBody>
-          <a:bodyPr rtlCol="0" anchor="ctr"/>
-          <a:lstStyle/>
-          <a:p>
-            <a:pPr algn="ctr"/>
-            <a:endParaRPr lang="en-US"/>
-          </a:p>
-        </p:txBody>
-      </p:sp>
-      <p:sp>
-        <p:nvSpPr>
-          <p:cNvPr id="14" name="TextBox 13">
-            <a:extLst>
-              <a:ext uri="{FF2B5EF4-FFF2-40B4-BE49-F238E27FC236}">
-                <a16:creationId xmlns:a16="http://schemas.microsoft.com/office/drawing/2014/main" id="{36B1C7CF-9979-DA17-B9BA-396119E0755E}"/>
-              </a:ext>
-            </a:extLst>
-          </p:cNvPr>
-          <p:cNvSpPr txBox="1"/>
-          <p:nvPr/>
-        </p:nvSpPr>
-        <p:spPr>
-          <a:xfrm>
-            <a:off x="2540361" y="2709030"/>
-            <a:ext cx="1515030" cy="369332"/>
-          </a:xfrm>
-          <a:prstGeom prst="rect">
-            <a:avLst/>
-          </a:prstGeom>
-          <a:noFill/>
-        </p:spPr>
-        <p:txBody>
-          <a:bodyPr wrap="none" rtlCol="0">
-            <a:spAutoFit/>
-          </a:bodyPr>
-          <a:lstStyle/>
-          <a:p>
-            <a:r>
               <a:rPr lang="en-US" i="1" dirty="0" err="1"/>
               <a:t>default_HTML</a:t>
             </a:r>
@@ -3671,41 +3622,6 @@
         <p:spPr>
           <a:xfrm>
             <a:off x="699573" y="2488997"/>
-            <a:ext cx="2025453" cy="369332"/>
-          </a:xfrm>
-          <a:prstGeom prst="rect">
-            <a:avLst/>
-          </a:prstGeom>
-          <a:noFill/>
-        </p:spPr>
-        <p:txBody>
-          <a:bodyPr wrap="square" rtlCol="0">
-            <a:spAutoFit/>
-          </a:bodyPr>
-          <a:lstStyle/>
-          <a:p>
-            <a:r>
-              <a:rPr lang="en-US" dirty="0"/>
-              <a:t>Initial files</a:t>
-            </a:r>
-          </a:p>
-        </p:txBody>
-      </p:sp>
-      <p:sp>
-        <p:nvSpPr>
-          <p:cNvPr id="16" name="TextBox 15">
-            <a:extLst>
-              <a:ext uri="{FF2B5EF4-FFF2-40B4-BE49-F238E27FC236}">
-                <a16:creationId xmlns:a16="http://schemas.microsoft.com/office/drawing/2014/main" id="{2A4A545D-9A60-F4CB-406A-6E283FB1BBCB}"/>
-              </a:ext>
-            </a:extLst>
-          </p:cNvPr>
-          <p:cNvSpPr txBox="1"/>
-          <p:nvPr/>
-        </p:nvSpPr>
-        <p:spPr>
-          <a:xfrm>
-            <a:off x="186006" y="436157"/>
             <a:ext cx="2025453" cy="369332"/>
           </a:xfrm>
           <a:prstGeom prst="rect">
@@ -6250,45 +6166,6 @@
       </p:sp>
       <p:sp>
         <p:nvSpPr>
-          <p:cNvPr id="136" name="TextBox 135">
-            <a:extLst>
-              <a:ext uri="{FF2B5EF4-FFF2-40B4-BE49-F238E27FC236}">
-                <a16:creationId xmlns:a16="http://schemas.microsoft.com/office/drawing/2014/main" id="{BD49C8D4-4172-745D-1CC8-AF710366BCFA}"/>
-              </a:ext>
-            </a:extLst>
-          </p:cNvPr>
-          <p:cNvSpPr txBox="1"/>
-          <p:nvPr/>
-        </p:nvSpPr>
-        <p:spPr>
-          <a:xfrm>
-            <a:off x="556516" y="313373"/>
-            <a:ext cx="540404" cy="276999"/>
-          </a:xfrm>
-          <a:prstGeom prst="rect">
-            <a:avLst/>
-          </a:prstGeom>
-          <a:noFill/>
-        </p:spPr>
-        <p:txBody>
-          <a:bodyPr wrap="none" rtlCol="0">
-            <a:spAutoFit/>
-          </a:bodyPr>
-          <a:lstStyle/>
-          <a:p>
-            <a:r>
-              <a:rPr lang="en-US" sz="1200" dirty="0">
-                <a:solidFill>
-                  <a:srgbClr val="7030A0"/>
-                </a:solidFill>
-              </a:rPr>
-              <a:t>Justin</a:t>
-            </a:r>
-          </a:p>
-        </p:txBody>
-      </p:sp>
-      <p:sp>
-        <p:nvSpPr>
           <p:cNvPr id="137" name="TextBox 136">
             <a:extLst>
               <a:ext uri="{FF2B5EF4-FFF2-40B4-BE49-F238E27FC236}">
@@ -7119,6 +6996,95 @@
                 </a:solidFill>
               </a:rPr>
               <a:t>Dan</a:t>
+            </a:r>
+          </a:p>
+        </p:txBody>
+      </p:sp>
+      <p:sp>
+        <p:nvSpPr>
+          <p:cNvPr id="2" name="Oval 1">
+            <a:extLst>
+              <a:ext uri="{FF2B5EF4-FFF2-40B4-BE49-F238E27FC236}">
+                <a16:creationId xmlns:a16="http://schemas.microsoft.com/office/drawing/2014/main" id="{5FA8309A-583F-9E3B-0F61-047062BABC6D}"/>
+              </a:ext>
+            </a:extLst>
+          </p:cNvPr>
+          <p:cNvSpPr/>
+          <p:nvPr/>
+        </p:nvSpPr>
+        <p:spPr>
+          <a:xfrm>
+            <a:off x="842418" y="799334"/>
+            <a:ext cx="313150" cy="313150"/>
+          </a:xfrm>
+          <a:prstGeom prst="ellipse">
+            <a:avLst/>
+          </a:prstGeom>
+          <a:noFill/>
+          <a:ln>
+            <a:prstDash val="sysDash"/>
+          </a:ln>
+        </p:spPr>
+        <p:style>
+          <a:lnRef idx="2">
+            <a:schemeClr val="accent1">
+              <a:shade val="50000"/>
+            </a:schemeClr>
+          </a:lnRef>
+          <a:fillRef idx="1">
+            <a:schemeClr val="accent1"/>
+          </a:fillRef>
+          <a:effectRef idx="0">
+            <a:schemeClr val="accent1"/>
+          </a:effectRef>
+          <a:fontRef idx="minor">
+            <a:schemeClr val="lt1"/>
+          </a:fontRef>
+        </p:style>
+        <p:txBody>
+          <a:bodyPr rtlCol="0" anchor="ctr"/>
+          <a:lstStyle/>
+          <a:p>
+            <a:pPr algn="ctr"/>
+            <a:endParaRPr lang="en-US" dirty="0">
+              <a:highlight>
+                <a:srgbClr val="FF0000"/>
+              </a:highlight>
+            </a:endParaRPr>
+          </a:p>
+        </p:txBody>
+      </p:sp>
+      <p:sp>
+        <p:nvSpPr>
+          <p:cNvPr id="3" name="TextBox 2">
+            <a:extLst>
+              <a:ext uri="{FF2B5EF4-FFF2-40B4-BE49-F238E27FC236}">
+                <a16:creationId xmlns:a16="http://schemas.microsoft.com/office/drawing/2014/main" id="{C0FA78FA-DF09-172C-6D7A-E66A079CFB65}"/>
+              </a:ext>
+            </a:extLst>
+          </p:cNvPr>
+          <p:cNvSpPr txBox="1"/>
+          <p:nvPr/>
+        </p:nvSpPr>
+        <p:spPr>
+          <a:xfrm>
+            <a:off x="215988" y="457202"/>
+            <a:ext cx="1066594" cy="369332"/>
+          </a:xfrm>
+          <a:prstGeom prst="rect">
+            <a:avLst/>
+          </a:prstGeom>
+          <a:noFill/>
+        </p:spPr>
+        <p:txBody>
+          <a:bodyPr wrap="square" rtlCol="0">
+            <a:spAutoFit/>
+          </a:bodyPr>
+          <a:lstStyle/>
+          <a:p>
+            <a:r>
+              <a:rPr lang="en-US" dirty="0"/>
+              <a:t>Skipped</a:t>
             </a:r>
           </a:p>
         </p:txBody>

</xml_diff>

<commit_message>
updated branch diagram to show merge of branches to dev rather than defualt_HTML
</commit_message>
<xml_diff>
--- a/GitBranchesDiagram-NBCC.pptx
+++ b/GitBranchesDiagram-NBCC.pptx
@@ -3500,7 +3500,7 @@
         </p:nvCxnSpPr>
         <p:spPr>
           <a:xfrm flipV="1">
-            <a:off x="1609592" y="2964002"/>
+            <a:off x="1911329" y="2175238"/>
             <a:ext cx="4072158" cy="22810"/>
           </a:xfrm>
           <a:prstGeom prst="straightConnector1">
@@ -4787,15 +4787,15 @@
           </p:cNvPr>
           <p:cNvCxnSpPr>
             <a:cxnSpLocks/>
-            <a:stCxn id="65" idx="0"/>
+            <a:stCxn id="65" idx="7"/>
             <a:endCxn id="79" idx="4"/>
           </p:cNvCxnSpPr>
           <p:nvPr/>
         </p:nvCxnSpPr>
         <p:spPr>
           <a:xfrm flipV="1">
-            <a:off x="3986368" y="3163440"/>
-            <a:ext cx="294620" cy="249556"/>
+            <a:off x="4097083" y="2374676"/>
+            <a:ext cx="597893" cy="1084180"/>
           </a:xfrm>
           <a:prstGeom prst="straightConnector1">
             <a:avLst/>
@@ -4830,14 +4830,15 @@
           </p:cNvPr>
           <p:cNvCxnSpPr>
             <a:cxnSpLocks/>
+            <a:stCxn id="66" idx="7"/>
             <a:endCxn id="80" idx="4"/>
           </p:cNvCxnSpPr>
           <p:nvPr/>
         </p:nvCxnSpPr>
         <p:spPr>
           <a:xfrm flipV="1">
-            <a:off x="4129243" y="3134865"/>
-            <a:ext cx="737532" cy="835344"/>
+            <a:off x="4153801" y="2346101"/>
+            <a:ext cx="1014711" cy="1608455"/>
           </a:xfrm>
           <a:prstGeom prst="straightConnector1">
             <a:avLst/>
@@ -4913,14 +4914,15 @@
           </p:cNvPr>
           <p:cNvCxnSpPr>
             <a:cxnSpLocks/>
+            <a:stCxn id="67" idx="7"/>
             <a:endCxn id="81" idx="3"/>
           </p:cNvCxnSpPr>
           <p:nvPr/>
         </p:nvCxnSpPr>
         <p:spPr>
           <a:xfrm flipV="1">
-            <a:off x="4194315" y="3074717"/>
-            <a:ext cx="1061807" cy="1431446"/>
+            <a:off x="4181512" y="2285953"/>
+            <a:ext cx="1376347" cy="2148748"/>
           </a:xfrm>
           <a:prstGeom prst="straightConnector1">
             <a:avLst/>
@@ -5001,14 +5003,15 @@
           </p:cNvPr>
           <p:cNvCxnSpPr>
             <a:cxnSpLocks/>
+            <a:stCxn id="76" idx="7"/>
             <a:endCxn id="82" idx="3"/>
           </p:cNvCxnSpPr>
           <p:nvPr/>
         </p:nvCxnSpPr>
         <p:spPr>
           <a:xfrm flipV="1">
-            <a:off x="4175114" y="3074717"/>
-            <a:ext cx="1552496" cy="1970305"/>
+            <a:off x="4239958" y="2285953"/>
+            <a:ext cx="1789389" cy="2628893"/>
           </a:xfrm>
           <a:prstGeom prst="straightConnector1">
             <a:avLst/>
@@ -5046,12 +5049,15 @@
         </p:nvSpPr>
         <p:spPr>
           <a:xfrm>
-            <a:off x="4124413" y="2850290"/>
+            <a:off x="4538401" y="2061526"/>
             <a:ext cx="313150" cy="313150"/>
           </a:xfrm>
           <a:prstGeom prst="ellipse">
             <a:avLst/>
           </a:prstGeom>
+          <a:solidFill>
+            <a:schemeClr val="accent2"/>
+          </a:solidFill>
         </p:spPr>
         <p:style>
           <a:lnRef idx="2">
@@ -5092,12 +5098,15 @@
         </p:nvSpPr>
         <p:spPr>
           <a:xfrm>
-            <a:off x="4710200" y="2821715"/>
+            <a:off x="5011937" y="2032951"/>
             <a:ext cx="313150" cy="313150"/>
           </a:xfrm>
           <a:prstGeom prst="ellipse">
             <a:avLst/>
           </a:prstGeom>
+          <a:solidFill>
+            <a:schemeClr val="accent2"/>
+          </a:solidFill>
         </p:spPr>
         <p:style>
           <a:lnRef idx="2">
@@ -5138,12 +5147,15 @@
         </p:nvSpPr>
         <p:spPr>
           <a:xfrm>
-            <a:off x="5210262" y="2807427"/>
+            <a:off x="5511999" y="2018663"/>
             <a:ext cx="313150" cy="313150"/>
           </a:xfrm>
           <a:prstGeom prst="ellipse">
             <a:avLst/>
           </a:prstGeom>
+          <a:solidFill>
+            <a:schemeClr val="accent2"/>
+          </a:solidFill>
         </p:spPr>
         <p:style>
           <a:lnRef idx="2">
@@ -5184,12 +5196,15 @@
         </p:nvSpPr>
         <p:spPr>
           <a:xfrm>
-            <a:off x="5681750" y="2807427"/>
+            <a:off x="5983487" y="2018663"/>
             <a:ext cx="313150" cy="313150"/>
           </a:xfrm>
           <a:prstGeom prst="ellipse">
             <a:avLst/>
           </a:prstGeom>
+          <a:solidFill>
+            <a:schemeClr val="accent2"/>
+          </a:solidFill>
         </p:spPr>
         <p:style>
           <a:lnRef idx="2">
@@ -5228,14 +5243,13 @@
           <p:cNvCxnSpPr>
             <a:cxnSpLocks/>
             <a:stCxn id="82" idx="7"/>
-            <a:endCxn id="93" idx="4"/>
           </p:cNvCxnSpPr>
           <p:nvPr/>
         </p:nvCxnSpPr>
         <p:spPr>
-          <a:xfrm flipV="1">
-            <a:off x="5949040" y="2324102"/>
-            <a:ext cx="176426" cy="529185"/>
+          <a:xfrm flipH="1">
+            <a:off x="6125466" y="2064523"/>
+            <a:ext cx="125311" cy="259579"/>
           </a:xfrm>
           <a:prstGeom prst="straightConnector1">
             <a:avLst/>
@@ -5259,12 +5273,89 @@
           </a:fontRef>
         </p:style>
       </p:cxnSp>
-      <p:sp>
-        <p:nvSpPr>
-          <p:cNvPr id="93" name="Oval 92">
-            <a:extLst>
-              <a:ext uri="{FF2B5EF4-FFF2-40B4-BE49-F238E27FC236}">
-                <a16:creationId xmlns:a16="http://schemas.microsoft.com/office/drawing/2014/main" id="{9BE28F44-2E76-0E12-86F9-2E1220E5A67B}"/>
+      <p:cxnSp>
+        <p:nvCxnSpPr>
+          <p:cNvPr id="97" name="Straight Arrow Connector 96">
+            <a:extLst>
+              <a:ext uri="{FF2B5EF4-FFF2-40B4-BE49-F238E27FC236}">
+                <a16:creationId xmlns:a16="http://schemas.microsoft.com/office/drawing/2014/main" id="{506C2E38-29C2-6EAF-3D31-4783AC052EC2}"/>
+              </a:ext>
+            </a:extLst>
+          </p:cNvPr>
+          <p:cNvCxnSpPr>
+            <a:cxnSpLocks/>
+            <a:endCxn id="18" idx="1"/>
+          </p:cNvCxnSpPr>
+          <p:nvPr/>
+        </p:nvCxnSpPr>
+        <p:spPr>
+          <a:xfrm>
+            <a:off x="6236181" y="2278242"/>
+            <a:ext cx="790406" cy="3253968"/>
+          </a:xfrm>
+          <a:prstGeom prst="straightConnector1">
+            <a:avLst/>
+          </a:prstGeom>
+          <a:ln>
+            <a:tailEnd type="triangle"/>
+          </a:ln>
+        </p:spPr>
+        <p:style>
+          <a:lnRef idx="1">
+            <a:schemeClr val="accent1"/>
+          </a:lnRef>
+          <a:fillRef idx="0">
+            <a:schemeClr val="accent1"/>
+          </a:fillRef>
+          <a:effectRef idx="0">
+            <a:schemeClr val="accent1"/>
+          </a:effectRef>
+          <a:fontRef idx="minor">
+            <a:schemeClr val="tx1"/>
+          </a:fontRef>
+        </p:style>
+      </p:cxnSp>
+      <p:sp>
+        <p:nvSpPr>
+          <p:cNvPr id="99" name="TextBox 98">
+            <a:extLst>
+              <a:ext uri="{FF2B5EF4-FFF2-40B4-BE49-F238E27FC236}">
+                <a16:creationId xmlns:a16="http://schemas.microsoft.com/office/drawing/2014/main" id="{5D0160A7-3880-2E72-15AA-1AA6853C03C9}"/>
+              </a:ext>
+            </a:extLst>
+          </p:cNvPr>
+          <p:cNvSpPr txBox="1"/>
+          <p:nvPr/>
+        </p:nvSpPr>
+        <p:spPr>
+          <a:xfrm>
+            <a:off x="4739300" y="1708674"/>
+            <a:ext cx="1444113" cy="369332"/>
+          </a:xfrm>
+          <a:prstGeom prst="rect">
+            <a:avLst/>
+          </a:prstGeom>
+          <a:noFill/>
+        </p:spPr>
+        <p:txBody>
+          <a:bodyPr wrap="none" rtlCol="0">
+            <a:spAutoFit/>
+          </a:bodyPr>
+          <a:lstStyle/>
+          <a:p>
+            <a:r>
+              <a:rPr lang="en-US" dirty="0"/>
+              <a:t>All html done</a:t>
+            </a:r>
+          </a:p>
+        </p:txBody>
+      </p:sp>
+      <p:sp>
+        <p:nvSpPr>
+          <p:cNvPr id="101" name="Oval 100">
+            <a:extLst>
+              <a:ext uri="{FF2B5EF4-FFF2-40B4-BE49-F238E27FC236}">
+                <a16:creationId xmlns:a16="http://schemas.microsoft.com/office/drawing/2014/main" id="{8E1AD9BE-73F0-70F8-EFC4-B97A686C09C2}"/>
               </a:ext>
             </a:extLst>
           </p:cNvPr>
@@ -5273,15 +5364,12 @@
         </p:nvSpPr>
         <p:spPr>
           <a:xfrm>
-            <a:off x="5968891" y="2010952"/>
+            <a:off x="7943923" y="5458259"/>
             <a:ext cx="313150" cy="313150"/>
           </a:xfrm>
           <a:prstGeom prst="ellipse">
             <a:avLst/>
           </a:prstGeom>
-          <a:solidFill>
-            <a:schemeClr val="accent2"/>
-          </a:solidFill>
         </p:spPr>
         <p:style>
           <a:lnRef idx="2">
@@ -5310,24 +5398,22 @@
       </p:sp>
       <p:cxnSp>
         <p:nvCxnSpPr>
-          <p:cNvPr id="97" name="Straight Arrow Connector 96">
-            <a:extLst>
-              <a:ext uri="{FF2B5EF4-FFF2-40B4-BE49-F238E27FC236}">
-                <a16:creationId xmlns:a16="http://schemas.microsoft.com/office/drawing/2014/main" id="{506C2E38-29C2-6EAF-3D31-4783AC052EC2}"/>
+          <p:cNvPr id="103" name="Straight Arrow Connector 102">
+            <a:extLst>
+              <a:ext uri="{FF2B5EF4-FFF2-40B4-BE49-F238E27FC236}">
+                <a16:creationId xmlns:a16="http://schemas.microsoft.com/office/drawing/2014/main" id="{1FF560F8-5BA0-1961-769A-E37ED347ECDD}"/>
               </a:ext>
             </a:extLst>
           </p:cNvPr>
           <p:cNvCxnSpPr>
             <a:cxnSpLocks/>
-            <a:stCxn id="93" idx="5"/>
-            <a:endCxn id="18" idx="1"/>
           </p:cNvCxnSpPr>
           <p:nvPr/>
         </p:nvCxnSpPr>
         <p:spPr>
           <a:xfrm>
-            <a:off x="6236181" y="2278242"/>
-            <a:ext cx="790406" cy="3253968"/>
+            <a:off x="7209732" y="6501836"/>
+            <a:ext cx="806621" cy="0"/>
           </a:xfrm>
           <a:prstGeom prst="straightConnector1">
             <a:avLst/>
@@ -5353,45 +5439,10 @@
       </p:cxnSp>
       <p:sp>
         <p:nvSpPr>
-          <p:cNvPr id="99" name="TextBox 98">
-            <a:extLst>
-              <a:ext uri="{FF2B5EF4-FFF2-40B4-BE49-F238E27FC236}">
-                <a16:creationId xmlns:a16="http://schemas.microsoft.com/office/drawing/2014/main" id="{5D0160A7-3880-2E72-15AA-1AA6853C03C9}"/>
-              </a:ext>
-            </a:extLst>
-          </p:cNvPr>
-          <p:cNvSpPr txBox="1"/>
-          <p:nvPr/>
-        </p:nvSpPr>
-        <p:spPr>
-          <a:xfrm>
-            <a:off x="4739300" y="1708674"/>
-            <a:ext cx="1444113" cy="369332"/>
-          </a:xfrm>
-          <a:prstGeom prst="rect">
-            <a:avLst/>
-          </a:prstGeom>
-          <a:noFill/>
-        </p:spPr>
-        <p:txBody>
-          <a:bodyPr wrap="none" rtlCol="0">
-            <a:spAutoFit/>
-          </a:bodyPr>
-          <a:lstStyle/>
-          <a:p>
-            <a:r>
-              <a:rPr lang="en-US" dirty="0"/>
-              <a:t>All html done</a:t>
-            </a:r>
-          </a:p>
-        </p:txBody>
-      </p:sp>
-      <p:sp>
-        <p:nvSpPr>
-          <p:cNvPr id="101" name="Oval 100">
-            <a:extLst>
-              <a:ext uri="{FF2B5EF4-FFF2-40B4-BE49-F238E27FC236}">
-                <a16:creationId xmlns:a16="http://schemas.microsoft.com/office/drawing/2014/main" id="{8E1AD9BE-73F0-70F8-EFC4-B97A686C09C2}"/>
+          <p:cNvPr id="104" name="Oval 103">
+            <a:extLst>
+              <a:ext uri="{FF2B5EF4-FFF2-40B4-BE49-F238E27FC236}">
+                <a16:creationId xmlns:a16="http://schemas.microsoft.com/office/drawing/2014/main" id="{C1C43E2F-F669-36E8-B708-023CC599C500}"/>
               </a:ext>
             </a:extLst>
           </p:cNvPr>
@@ -5400,7 +5451,7 @@
         </p:nvSpPr>
         <p:spPr>
           <a:xfrm>
-            <a:off x="7943923" y="5458259"/>
+            <a:off x="7053157" y="6345261"/>
             <a:ext cx="313150" cy="313150"/>
           </a:xfrm>
           <a:prstGeom prst="ellipse">
@@ -5432,53 +5483,47 @@
           </a:p>
         </p:txBody>
       </p:sp>
-      <p:cxnSp>
-        <p:nvCxnSpPr>
-          <p:cNvPr id="103" name="Straight Arrow Connector 102">
-            <a:extLst>
-              <a:ext uri="{FF2B5EF4-FFF2-40B4-BE49-F238E27FC236}">
-                <a16:creationId xmlns:a16="http://schemas.microsoft.com/office/drawing/2014/main" id="{1FF560F8-5BA0-1961-769A-E37ED347ECDD}"/>
-              </a:ext>
-            </a:extLst>
-          </p:cNvPr>
-          <p:cNvCxnSpPr>
-            <a:cxnSpLocks/>
-          </p:cNvCxnSpPr>
-          <p:nvPr/>
-        </p:nvCxnSpPr>
-        <p:spPr>
-          <a:xfrm>
-            <a:off x="7209732" y="6501836"/>
-            <a:ext cx="806621" cy="0"/>
-          </a:xfrm>
-          <a:prstGeom prst="straightConnector1">
-            <a:avLst/>
-          </a:prstGeom>
-          <a:ln>
-            <a:tailEnd type="triangle"/>
-          </a:ln>
-        </p:spPr>
-        <p:style>
-          <a:lnRef idx="1">
-            <a:schemeClr val="accent1"/>
-          </a:lnRef>
-          <a:fillRef idx="0">
-            <a:schemeClr val="accent1"/>
-          </a:fillRef>
-          <a:effectRef idx="0">
-            <a:schemeClr val="accent1"/>
-          </a:effectRef>
-          <a:fontRef idx="minor">
-            <a:schemeClr val="tx1"/>
-          </a:fontRef>
-        </p:style>
-      </p:cxnSp>
-      <p:sp>
-        <p:nvSpPr>
-          <p:cNvPr id="104" name="Oval 103">
-            <a:extLst>
-              <a:ext uri="{FF2B5EF4-FFF2-40B4-BE49-F238E27FC236}">
-                <a16:creationId xmlns:a16="http://schemas.microsoft.com/office/drawing/2014/main" id="{C1C43E2F-F669-36E8-B708-023CC599C500}"/>
+      <p:sp>
+        <p:nvSpPr>
+          <p:cNvPr id="105" name="TextBox 104">
+            <a:extLst>
+              <a:ext uri="{FF2B5EF4-FFF2-40B4-BE49-F238E27FC236}">
+                <a16:creationId xmlns:a16="http://schemas.microsoft.com/office/drawing/2014/main" id="{919279BA-4163-D2CE-BBA5-3797D20619EA}"/>
+              </a:ext>
+            </a:extLst>
+          </p:cNvPr>
+          <p:cNvSpPr txBox="1"/>
+          <p:nvPr/>
+        </p:nvSpPr>
+        <p:spPr>
+          <a:xfrm>
+            <a:off x="7209732" y="6044289"/>
+            <a:ext cx="1065701" cy="369332"/>
+          </a:xfrm>
+          <a:prstGeom prst="rect">
+            <a:avLst/>
+          </a:prstGeom>
+          <a:noFill/>
+        </p:spPr>
+        <p:txBody>
+          <a:bodyPr wrap="square" rtlCol="0">
+            <a:spAutoFit/>
+          </a:bodyPr>
+          <a:lstStyle/>
+          <a:p>
+            <a:r>
+              <a:rPr lang="en-US" i="1" dirty="0"/>
+              <a:t>Content</a:t>
+            </a:r>
+          </a:p>
+        </p:txBody>
+      </p:sp>
+      <p:sp>
+        <p:nvSpPr>
+          <p:cNvPr id="106" name="Oval 105">
+            <a:extLst>
+              <a:ext uri="{FF2B5EF4-FFF2-40B4-BE49-F238E27FC236}">
+                <a16:creationId xmlns:a16="http://schemas.microsoft.com/office/drawing/2014/main" id="{520AC8AE-73B3-DA2C-4768-0EF3E6942E0B}"/>
               </a:ext>
             </a:extLst>
           </p:cNvPr>
@@ -5487,7 +5532,7 @@
         </p:nvSpPr>
         <p:spPr>
           <a:xfrm>
-            <a:off x="7053157" y="6345261"/>
+            <a:off x="8016353" y="6317170"/>
             <a:ext cx="313150" cy="313150"/>
           </a:xfrm>
           <a:prstGeom prst="ellipse">
@@ -5519,87 +5564,6 @@
           </a:p>
         </p:txBody>
       </p:sp>
-      <p:sp>
-        <p:nvSpPr>
-          <p:cNvPr id="105" name="TextBox 104">
-            <a:extLst>
-              <a:ext uri="{FF2B5EF4-FFF2-40B4-BE49-F238E27FC236}">
-                <a16:creationId xmlns:a16="http://schemas.microsoft.com/office/drawing/2014/main" id="{919279BA-4163-D2CE-BBA5-3797D20619EA}"/>
-              </a:ext>
-            </a:extLst>
-          </p:cNvPr>
-          <p:cNvSpPr txBox="1"/>
-          <p:nvPr/>
-        </p:nvSpPr>
-        <p:spPr>
-          <a:xfrm>
-            <a:off x="7209732" y="6044289"/>
-            <a:ext cx="1065701" cy="369332"/>
-          </a:xfrm>
-          <a:prstGeom prst="rect">
-            <a:avLst/>
-          </a:prstGeom>
-          <a:noFill/>
-        </p:spPr>
-        <p:txBody>
-          <a:bodyPr wrap="square" rtlCol="0">
-            <a:spAutoFit/>
-          </a:bodyPr>
-          <a:lstStyle/>
-          <a:p>
-            <a:r>
-              <a:rPr lang="en-US" i="1" dirty="0"/>
-              <a:t>Content</a:t>
-            </a:r>
-          </a:p>
-        </p:txBody>
-      </p:sp>
-      <p:sp>
-        <p:nvSpPr>
-          <p:cNvPr id="106" name="Oval 105">
-            <a:extLst>
-              <a:ext uri="{FF2B5EF4-FFF2-40B4-BE49-F238E27FC236}">
-                <a16:creationId xmlns:a16="http://schemas.microsoft.com/office/drawing/2014/main" id="{520AC8AE-73B3-DA2C-4768-0EF3E6942E0B}"/>
-              </a:ext>
-            </a:extLst>
-          </p:cNvPr>
-          <p:cNvSpPr/>
-          <p:nvPr/>
-        </p:nvSpPr>
-        <p:spPr>
-          <a:xfrm>
-            <a:off x="8016353" y="6317170"/>
-            <a:ext cx="313150" cy="313150"/>
-          </a:xfrm>
-          <a:prstGeom prst="ellipse">
-            <a:avLst/>
-          </a:prstGeom>
-        </p:spPr>
-        <p:style>
-          <a:lnRef idx="2">
-            <a:schemeClr val="accent1">
-              <a:shade val="50000"/>
-            </a:schemeClr>
-          </a:lnRef>
-          <a:fillRef idx="1">
-            <a:schemeClr val="accent1"/>
-          </a:fillRef>
-          <a:effectRef idx="0">
-            <a:schemeClr val="accent1"/>
-          </a:effectRef>
-          <a:fontRef idx="minor">
-            <a:schemeClr val="lt1"/>
-          </a:fontRef>
-        </p:style>
-        <p:txBody>
-          <a:bodyPr rtlCol="0" anchor="ctr"/>
-          <a:lstStyle/>
-          <a:p>
-            <a:pPr algn="ctr"/>
-            <a:endParaRPr lang="en-US"/>
-          </a:p>
-        </p:txBody>
-      </p:sp>
       <p:cxnSp>
         <p:nvCxnSpPr>
           <p:cNvPr id="107" name="Straight Arrow Connector 106">
@@ -5611,7 +5575,6 @@
           </p:cNvPr>
           <p:cNvCxnSpPr>
             <a:cxnSpLocks/>
-            <a:stCxn id="93" idx="5"/>
             <a:endCxn id="104" idx="1"/>
           </p:cNvCxnSpPr>
           <p:nvPr/>
@@ -6086,10 +6049,10 @@
       </p:cxnSp>
       <p:sp>
         <p:nvSpPr>
-          <p:cNvPr id="135" name="TextBox 134">
-            <a:extLst>
-              <a:ext uri="{FF2B5EF4-FFF2-40B4-BE49-F238E27FC236}">
-                <a16:creationId xmlns:a16="http://schemas.microsoft.com/office/drawing/2014/main" id="{528705A0-ADBA-32B3-7350-0CB66ED137A5}"/>
+          <p:cNvPr id="137" name="TextBox 136">
+            <a:extLst>
+              <a:ext uri="{FF2B5EF4-FFF2-40B4-BE49-F238E27FC236}">
+                <a16:creationId xmlns:a16="http://schemas.microsoft.com/office/drawing/2014/main" id="{4711CD0B-2FF3-1947-E924-80C49FEC5859}"/>
               </a:ext>
             </a:extLst>
           </p:cNvPr>
@@ -6098,8 +6061,8 @@
         </p:nvSpPr>
         <p:spPr>
           <a:xfrm>
-            <a:off x="186225" y="5635514"/>
-            <a:ext cx="4085477" cy="1200329"/>
+            <a:off x="8549829" y="5703878"/>
+            <a:ext cx="3525601" cy="923330"/>
           </a:xfrm>
           <a:prstGeom prst="rect">
             <a:avLst/>
@@ -6116,14 +6079,14 @@
           </a:ln>
         </p:spPr>
         <p:txBody>
-          <a:bodyPr wrap="none" rtlCol="0">
+          <a:bodyPr wrap="square" rtlCol="0">
             <a:spAutoFit/>
           </a:bodyPr>
           <a:lstStyle/>
           <a:p>
             <a:r>
               <a:rPr lang="en-US" dirty="0"/>
-              <a:t>Note: </a:t>
+              <a:t>Question: </a:t>
             </a:r>
           </a:p>
           <a:p>
@@ -6133,86 +6096,6 @@
             </a:pPr>
             <a:r>
               <a:rPr lang="en-US" dirty="0"/>
-              <a:t>We needed to Delete </a:t>
-            </a:r>
-            <a:r>
-              <a:rPr lang="en-US" dirty="0" err="1"/>
-              <a:t>Default_HTML</a:t>
-            </a:r>
-            <a:br>
-              <a:rPr lang="en-US" dirty="0"/>
-            </a:br>
-            <a:r>
-              <a:rPr lang="en-US" dirty="0"/>
-              <a:t>because we already have </a:t>
-            </a:r>
-            <a:r>
-              <a:rPr lang="en-US" dirty="0" err="1"/>
-              <a:t>default_html</a:t>
-            </a:r>
-            <a:endParaRPr lang="en-US" dirty="0"/>
-          </a:p>
-          <a:p>
-            <a:pPr marL="285750" indent="-285750">
-              <a:buFont typeface="Arial" panose="020B0604020202020204" pitchFamily="34" charset="0"/>
-              <a:buChar char="•"/>
-            </a:pPr>
-            <a:r>
-              <a:rPr lang="en-US" dirty="0"/>
-              <a:t>We needed to add a content branch</a:t>
-            </a:r>
-          </a:p>
-        </p:txBody>
-      </p:sp>
-      <p:sp>
-        <p:nvSpPr>
-          <p:cNvPr id="137" name="TextBox 136">
-            <a:extLst>
-              <a:ext uri="{FF2B5EF4-FFF2-40B4-BE49-F238E27FC236}">
-                <a16:creationId xmlns:a16="http://schemas.microsoft.com/office/drawing/2014/main" id="{4711CD0B-2FF3-1947-E924-80C49FEC5859}"/>
-              </a:ext>
-            </a:extLst>
-          </p:cNvPr>
-          <p:cNvSpPr txBox="1"/>
-          <p:nvPr/>
-        </p:nvSpPr>
-        <p:spPr>
-          <a:xfrm>
-            <a:off x="8577235" y="5304361"/>
-            <a:ext cx="3525601" cy="1477328"/>
-          </a:xfrm>
-          <a:prstGeom prst="rect">
-            <a:avLst/>
-          </a:prstGeom>
-          <a:noFill/>
-          <a:ln>
-            <a:solidFill>
-              <a:schemeClr val="tx1">
-                <a:lumMod val="50000"/>
-                <a:lumOff val="50000"/>
-              </a:schemeClr>
-            </a:solidFill>
-            <a:prstDash val="sysDash"/>
-          </a:ln>
-        </p:spPr>
-        <p:txBody>
-          <a:bodyPr wrap="square" rtlCol="0">
-            <a:spAutoFit/>
-          </a:bodyPr>
-          <a:lstStyle/>
-          <a:p>
-            <a:r>
-              <a:rPr lang="en-US" dirty="0"/>
-              <a:t>Question: </a:t>
-            </a:r>
-          </a:p>
-          <a:p>
-            <a:pPr marL="285750" indent="-285750">
-              <a:buFont typeface="Arial" panose="020B0604020202020204" pitchFamily="34" charset="0"/>
-              <a:buChar char="•"/>
-            </a:pPr>
-            <a:r>
-              <a:rPr lang="en-US" dirty="0"/>
               <a:t>Do we need a </a:t>
             </a:r>
             <a:r>
@@ -6224,16 +6107,6 @@
               <a:t> branch? Why?</a:t>
             </a:r>
           </a:p>
-          <a:p>
-            <a:pPr marL="285750" indent="-285750">
-              <a:buFont typeface="Arial" panose="020B0604020202020204" pitchFamily="34" charset="0"/>
-              <a:buChar char="•"/>
-            </a:pPr>
-            <a:r>
-              <a:rPr lang="en-US" dirty="0"/>
-              <a:t>Alex what do you want to do (Content? A particular product?)</a:t>
-            </a:r>
-          </a:p>
         </p:txBody>
       </p:sp>
       <p:sp>
@@ -6251,7 +6124,7 @@
         <p:spPr>
           <a:xfrm>
             <a:off x="7462033" y="5888544"/>
-            <a:ext cx="255198" cy="276999"/>
+            <a:ext cx="451662" cy="276999"/>
           </a:xfrm>
           <a:prstGeom prst="rect">
             <a:avLst/>
@@ -6270,7 +6143,7 @@
                   <a:srgbClr val="7030A0"/>
                 </a:solidFill>
               </a:rPr>
-              <a:t>?</a:t>
+              <a:t>Alex</a:t>
             </a:r>
           </a:p>
         </p:txBody>
@@ -6664,7 +6537,7 @@
         <p:spPr>
           <a:xfrm>
             <a:off x="10143382" y="4828175"/>
-            <a:ext cx="255198" cy="276999"/>
+            <a:ext cx="451662" cy="276999"/>
           </a:xfrm>
           <a:prstGeom prst="rect">
             <a:avLst/>
@@ -6683,7 +6556,7 @@
                   <a:srgbClr val="7030A0"/>
                 </a:solidFill>
               </a:rPr>
-              <a:t>?</a:t>
+              <a:t>Alex</a:t>
             </a:r>
           </a:p>
         </p:txBody>

</xml_diff>

<commit_message>
show copying of index.html to dev in diagram
</commit_message>
<xml_diff>
--- a/GitBranchesDiagram-NBCC.pptx
+++ b/GitBranchesDiagram-NBCC.pptx
@@ -259,7 +259,7 @@
           <a:p>
             <a:fld id="{AB2D5D47-E4DB-544B-A37D-B2BE19CA19D0}" type="datetimeFigureOut">
               <a:rPr lang="en-US" smtClean="0"/>
-              <a:t>2/5/23</a:t>
+              <a:t>2/6/23</a:t>
             </a:fld>
             <a:endParaRPr lang="en-US"/>
           </a:p>
@@ -457,7 +457,7 @@
           <a:p>
             <a:fld id="{AB2D5D47-E4DB-544B-A37D-B2BE19CA19D0}" type="datetimeFigureOut">
               <a:rPr lang="en-US" smtClean="0"/>
-              <a:t>2/5/23</a:t>
+              <a:t>2/6/23</a:t>
             </a:fld>
             <a:endParaRPr lang="en-US"/>
           </a:p>
@@ -665,7 +665,7 @@
           <a:p>
             <a:fld id="{AB2D5D47-E4DB-544B-A37D-B2BE19CA19D0}" type="datetimeFigureOut">
               <a:rPr lang="en-US" smtClean="0"/>
-              <a:t>2/5/23</a:t>
+              <a:t>2/6/23</a:t>
             </a:fld>
             <a:endParaRPr lang="en-US"/>
           </a:p>
@@ -863,7 +863,7 @@
           <a:p>
             <a:fld id="{AB2D5D47-E4DB-544B-A37D-B2BE19CA19D0}" type="datetimeFigureOut">
               <a:rPr lang="en-US" smtClean="0"/>
-              <a:t>2/5/23</a:t>
+              <a:t>2/6/23</a:t>
             </a:fld>
             <a:endParaRPr lang="en-US"/>
           </a:p>
@@ -1138,7 +1138,7 @@
           <a:p>
             <a:fld id="{AB2D5D47-E4DB-544B-A37D-B2BE19CA19D0}" type="datetimeFigureOut">
               <a:rPr lang="en-US" smtClean="0"/>
-              <a:t>2/5/23</a:t>
+              <a:t>2/6/23</a:t>
             </a:fld>
             <a:endParaRPr lang="en-US"/>
           </a:p>
@@ -1403,7 +1403,7 @@
           <a:p>
             <a:fld id="{AB2D5D47-E4DB-544B-A37D-B2BE19CA19D0}" type="datetimeFigureOut">
               <a:rPr lang="en-US" smtClean="0"/>
-              <a:t>2/5/23</a:t>
+              <a:t>2/6/23</a:t>
             </a:fld>
             <a:endParaRPr lang="en-US"/>
           </a:p>
@@ -1815,7 +1815,7 @@
           <a:p>
             <a:fld id="{AB2D5D47-E4DB-544B-A37D-B2BE19CA19D0}" type="datetimeFigureOut">
               <a:rPr lang="en-US" smtClean="0"/>
-              <a:t>2/5/23</a:t>
+              <a:t>2/6/23</a:t>
             </a:fld>
             <a:endParaRPr lang="en-US"/>
           </a:p>
@@ -1956,7 +1956,7 @@
           <a:p>
             <a:fld id="{AB2D5D47-E4DB-544B-A37D-B2BE19CA19D0}" type="datetimeFigureOut">
               <a:rPr lang="en-US" smtClean="0"/>
-              <a:t>2/5/23</a:t>
+              <a:t>2/6/23</a:t>
             </a:fld>
             <a:endParaRPr lang="en-US"/>
           </a:p>
@@ -2069,7 +2069,7 @@
           <a:p>
             <a:fld id="{AB2D5D47-E4DB-544B-A37D-B2BE19CA19D0}" type="datetimeFigureOut">
               <a:rPr lang="en-US" smtClean="0"/>
-              <a:t>2/5/23</a:t>
+              <a:t>2/6/23</a:t>
             </a:fld>
             <a:endParaRPr lang="en-US"/>
           </a:p>
@@ -2380,7 +2380,7 @@
           <a:p>
             <a:fld id="{AB2D5D47-E4DB-544B-A37D-B2BE19CA19D0}" type="datetimeFigureOut">
               <a:rPr lang="en-US" smtClean="0"/>
-              <a:t>2/5/23</a:t>
+              <a:t>2/6/23</a:t>
             </a:fld>
             <a:endParaRPr lang="en-US"/>
           </a:p>
@@ -2668,7 +2668,7 @@
           <a:p>
             <a:fld id="{AB2D5D47-E4DB-544B-A37D-B2BE19CA19D0}" type="datetimeFigureOut">
               <a:rPr lang="en-US" smtClean="0"/>
-              <a:t>2/5/23</a:t>
+              <a:t>2/6/23</a:t>
             </a:fld>
             <a:endParaRPr lang="en-US"/>
           </a:p>
@@ -2909,7 +2909,7 @@
           <a:p>
             <a:fld id="{AB2D5D47-E4DB-544B-A37D-B2BE19CA19D0}" type="datetimeFigureOut">
               <a:rPr lang="en-US" smtClean="0"/>
-              <a:t>2/5/23</a:t>
+              <a:t>2/6/23</a:t>
             </a:fld>
             <a:endParaRPr lang="en-US"/>
           </a:p>
@@ -5329,8 +5329,8 @@
         </p:nvSpPr>
         <p:spPr>
           <a:xfrm>
-            <a:off x="4739300" y="1708674"/>
-            <a:ext cx="1444113" cy="369332"/>
+            <a:off x="4953794" y="1606763"/>
+            <a:ext cx="1920206" cy="369332"/>
           </a:xfrm>
           <a:prstGeom prst="rect">
             <a:avLst/>
@@ -5345,7 +5345,7 @@
           <a:p>
             <a:r>
               <a:rPr lang="en-US" dirty="0"/>
-              <a:t>All html done</a:t>
+              <a:t>V0.1 All html done</a:t>
             </a:r>
           </a:p>
         </p:txBody>
@@ -6958,6 +6958,106 @@
             <a:r>
               <a:rPr lang="en-US" dirty="0"/>
               <a:t>Skipped</a:t>
+            </a:r>
+          </a:p>
+        </p:txBody>
+      </p:sp>
+      <p:sp>
+        <p:nvSpPr>
+          <p:cNvPr id="6" name="Oval 5">
+            <a:extLst>
+              <a:ext uri="{FF2B5EF4-FFF2-40B4-BE49-F238E27FC236}">
+                <a16:creationId xmlns:a16="http://schemas.microsoft.com/office/drawing/2014/main" id="{762849B5-ED77-DEF9-93A1-7F5F958CAABA}"/>
+              </a:ext>
+            </a:extLst>
+          </p:cNvPr>
+          <p:cNvSpPr/>
+          <p:nvPr/>
+        </p:nvSpPr>
+        <p:spPr>
+          <a:xfrm>
+            <a:off x="4074938" y="2049000"/>
+            <a:ext cx="313150" cy="313150"/>
+          </a:xfrm>
+          <a:prstGeom prst="ellipse">
+            <a:avLst/>
+          </a:prstGeom>
+          <a:solidFill>
+            <a:schemeClr val="accent2"/>
+          </a:solidFill>
+        </p:spPr>
+        <p:style>
+          <a:lnRef idx="2">
+            <a:schemeClr val="accent1">
+              <a:shade val="50000"/>
+            </a:schemeClr>
+          </a:lnRef>
+          <a:fillRef idx="1">
+            <a:schemeClr val="accent1"/>
+          </a:fillRef>
+          <a:effectRef idx="0">
+            <a:schemeClr val="accent1"/>
+          </a:effectRef>
+          <a:fontRef idx="minor">
+            <a:schemeClr val="lt1"/>
+          </a:fontRef>
+        </p:style>
+        <p:txBody>
+          <a:bodyPr rtlCol="0" anchor="ctr"/>
+          <a:lstStyle/>
+          <a:p>
+            <a:pPr algn="ctr"/>
+            <a:endParaRPr lang="en-US"/>
+          </a:p>
+        </p:txBody>
+      </p:sp>
+      <p:sp>
+        <p:nvSpPr>
+          <p:cNvPr id="7" name="TextBox 6">
+            <a:extLst>
+              <a:ext uri="{FF2B5EF4-FFF2-40B4-BE49-F238E27FC236}">
+                <a16:creationId xmlns:a16="http://schemas.microsoft.com/office/drawing/2014/main" id="{D53F0A91-4C11-29E3-9F52-09DEA9ED2D00}"/>
+              </a:ext>
+            </a:extLst>
+          </p:cNvPr>
+          <p:cNvSpPr txBox="1"/>
+          <p:nvPr/>
+        </p:nvSpPr>
+        <p:spPr>
+          <a:xfrm>
+            <a:off x="2739042" y="1670999"/>
+            <a:ext cx="1771663" cy="461665"/>
+          </a:xfrm>
+          <a:prstGeom prst="rect">
+            <a:avLst/>
+          </a:prstGeom>
+          <a:noFill/>
+        </p:spPr>
+        <p:txBody>
+          <a:bodyPr wrap="square" rtlCol="0">
+            <a:spAutoFit/>
+          </a:bodyPr>
+          <a:lstStyle/>
+          <a:p>
+            <a:r>
+              <a:rPr lang="en-US" sz="1200" dirty="0"/>
+              <a:t>Copied </a:t>
+            </a:r>
+            <a:r>
+              <a:rPr lang="en-US" sz="1200" dirty="0" err="1"/>
+              <a:t>index.html</a:t>
+            </a:r>
+            <a:r>
+              <a:rPr lang="en-US" sz="1200" dirty="0"/>
+              <a:t> from </a:t>
+            </a:r>
+            <a:r>
+              <a:rPr lang="en-US" sz="1200" dirty="0" err="1"/>
+              <a:t>default_html</a:t>
+            </a:r>
+            <a:r>
+              <a:rPr lang="en-US" sz="1200" dirty="0"/>
+              <a:t> branch</a:t>
             </a:r>
           </a:p>
         </p:txBody>

</xml_diff>